<commit_message>
Update Powerpoints, minor restructuring, revision and practice questions
</commit_message>
<xml_diff>
--- a/cits1003-lecture_slides/CITS1003-3 Computers and Architecture.pptx
+++ b/cits1003-lecture_slides/CITS1003-3 Computers and Architecture.pptx
@@ -156,14 +156,6 @@
     </p:extLst>
   </p:cmAuthor>
 </p:cmAuthorLst>
-</file>
-
-<file path=ppt/revisionInfo.xml><?xml version="1.0" encoding="utf-8"?>
-<p1510:revInfo xmlns:a="http://schemas.openxmlformats.org/drawingml/2006/main" xmlns:r="http://schemas.openxmlformats.org/officeDocument/2006/relationships" xmlns:p1510="http://schemas.microsoft.com/office/powerpoint/2015/10/main">
-  <p1510:revLst>
-    <p1510:client id="{A868E236-8D18-42FB-9796-1ED3F6EAB646}" v="350" dt="2024-02-23T05:40:50.334"/>
-  </p1510:revLst>
-</p1510:revInfo>
 </file>
 
 <file path=ppt/changesInfos/changesInfo1.xml><?xml version="1.0" encoding="utf-8"?>
@@ -792,6 +784,30 @@
             <ac:spMk id="3" creationId="{76A1AE19-EC68-5979-E8FD-B51307DC36CC}"/>
           </ac:spMkLst>
         </pc:spChg>
+      </pc:sldChg>
+    </pc:docChg>
+  </pc:docChgLst>
+  <pc:docChgLst>
+    <pc:chgData name="Robert McKnight" userId="d5c7fb24-67df-49c0-a0e8-7fe946ae099c" providerId="ADAL" clId="{EF946BC1-D1BC-473A-88E8-554EBED2D818}"/>
+    <pc:docChg chg="custSel modSld">
+      <pc:chgData name="Robert McKnight" userId="d5c7fb24-67df-49c0-a0e8-7fe946ae099c" providerId="ADAL" clId="{EF946BC1-D1BC-473A-88E8-554EBED2D818}" dt="2024-06-25T02:01:15.147" v="0" actId="313"/>
+      <pc:docMkLst>
+        <pc:docMk/>
+      </pc:docMkLst>
+      <pc:sldChg chg="modSp mod">
+        <pc:chgData name="Robert McKnight" userId="d5c7fb24-67df-49c0-a0e8-7fe946ae099c" providerId="ADAL" clId="{EF946BC1-D1BC-473A-88E8-554EBED2D818}" dt="2024-06-25T02:01:15.147" v="0" actId="313"/>
+        <pc:sldMkLst>
+          <pc:docMk/>
+          <pc:sldMk cId="3692546992" sldId="350"/>
+        </pc:sldMkLst>
+        <pc:graphicFrameChg chg="modGraphic">
+          <ac:chgData name="Robert McKnight" userId="d5c7fb24-67df-49c0-a0e8-7fe946ae099c" providerId="ADAL" clId="{EF946BC1-D1BC-473A-88E8-554EBED2D818}" dt="2024-06-25T02:01:15.147" v="0" actId="313"/>
+          <ac:graphicFrameMkLst>
+            <pc:docMk/>
+            <pc:sldMk cId="3692546992" sldId="350"/>
+            <ac:graphicFrameMk id="4" creationId="{688270C1-BD04-34A2-C90A-2B1A1324947C}"/>
+          </ac:graphicFrameMkLst>
+        </pc:graphicFrameChg>
       </pc:sldChg>
     </pc:docChg>
   </pc:docChgLst>
@@ -19792,7 +19808,7 @@
           <a:p>
             <a:fld id="{6D6D7260-B7E4-B548-BD1F-84ED14536037}" type="datetimeFigureOut">
               <a:rPr lang="en-AU" smtClean="0"/>
-              <a:t>26/02/2024</a:t>
+              <a:t>25/06/2024</a:t>
             </a:fld>
             <a:endParaRPr lang="en-AU"/>
           </a:p>
@@ -20245,7 +20261,7 @@
           <a:p>
             <a:fld id="{88D38747-4367-4BD2-8D51-C97E202738E2}" type="datetime1">
               <a:rPr lang="en-US" smtClean="0"/>
-              <a:t>2/26/2024</a:t>
+              <a:t>6/25/2024</a:t>
             </a:fld>
             <a:endParaRPr lang="en-US" dirty="0"/>
           </a:p>
@@ -20550,7 +20566,7 @@
           <a:p>
             <a:fld id="{11F1B079-7EF0-44EE-B798-BCC497C9F3B2}" type="datetime1">
               <a:rPr lang="en-US" smtClean="0"/>
-              <a:t>2/26/2024</a:t>
+              <a:t>6/25/2024</a:t>
             </a:fld>
             <a:endParaRPr lang="en-US" dirty="0"/>
           </a:p>
@@ -20744,7 +20760,7 @@
           <a:p>
             <a:fld id="{28FF70A8-1D13-4657-95F0-A9EA54967B8D}" type="datetime1">
               <a:rPr lang="en-US" smtClean="0"/>
-              <a:t>2/26/2024</a:t>
+              <a:t>6/25/2024</a:t>
             </a:fld>
             <a:endParaRPr lang="en-US" dirty="0"/>
           </a:p>
@@ -21007,7 +21023,7 @@
           <a:p>
             <a:fld id="{21EB90AC-71BD-4C7F-8ACA-7B3F18292E63}" type="datetime1">
               <a:rPr lang="en-US" smtClean="0"/>
-              <a:t>2/26/2024</a:t>
+              <a:t>6/25/2024</a:t>
             </a:fld>
             <a:endParaRPr lang="en-US" dirty="0"/>
           </a:p>
@@ -21443,7 +21459,7 @@
           <a:p>
             <a:fld id="{4E6EFC2C-8905-46F0-B443-CE905B76BA01}" type="datetime1">
               <a:rPr lang="en-US" smtClean="0"/>
-              <a:t>2/26/2024</a:t>
+              <a:t>6/25/2024</a:t>
             </a:fld>
             <a:endParaRPr lang="en-US" dirty="0"/>
           </a:p>
@@ -21980,7 +21996,7 @@
           <a:p>
             <a:fld id="{D9079DC3-C9B5-499E-9140-0DC28B7074E2}" type="datetime1">
               <a:rPr lang="en-US" smtClean="0"/>
-              <a:t>2/26/2024</a:t>
+              <a:t>6/25/2024</a:t>
             </a:fld>
             <a:endParaRPr lang="en-US" dirty="0"/>
           </a:p>
@@ -22862,7 +22878,7 @@
           <a:p>
             <a:fld id="{30BB33EA-E472-4D22-9C03-A9C14AA21CED}" type="datetime1">
               <a:rPr lang="en-US" smtClean="0"/>
-              <a:t>2/26/2024</a:t>
+              <a:t>6/25/2024</a:t>
             </a:fld>
             <a:endParaRPr lang="en-US" dirty="0"/>
           </a:p>
@@ -23032,7 +23048,7 @@
           <a:p>
             <a:fld id="{217E833E-1B6D-415F-AD29-75AE8C43BD0D}" type="datetime1">
               <a:rPr lang="en-US" smtClean="0"/>
-              <a:t>2/26/2024</a:t>
+              <a:t>6/25/2024</a:t>
             </a:fld>
             <a:endParaRPr lang="en-US" dirty="0"/>
           </a:p>
@@ -23216,7 +23232,7 @@
           <a:p>
             <a:fld id="{8452596F-08A7-4B70-989A-F2B1CF31E66B}" type="datetime1">
               <a:rPr lang="en-US" smtClean="0"/>
-              <a:t>2/26/2024</a:t>
+              <a:t>6/25/2024</a:t>
             </a:fld>
             <a:endParaRPr lang="en-US" dirty="0"/>
           </a:p>
@@ -23404,7 +23420,7 @@
           <a:p>
             <a:fld id="{73C55A3C-5767-4844-A0A3-83778C2E5409}" type="datetime1">
               <a:rPr lang="en-US" smtClean="0"/>
-              <a:t>2/26/2024</a:t>
+              <a:t>6/25/2024</a:t>
             </a:fld>
             <a:endParaRPr lang="en-US" dirty="0"/>
           </a:p>
@@ -23648,7 +23664,7 @@
           <a:p>
             <a:fld id="{CAE507A8-A5CF-4D38-AB86-7EDDA87A85D4}" type="datetime1">
               <a:rPr lang="en-US" smtClean="0"/>
-              <a:t>2/26/2024</a:t>
+              <a:t>6/25/2024</a:t>
             </a:fld>
             <a:endParaRPr lang="en-US" dirty="0"/>
           </a:p>
@@ -23890,7 +23906,7 @@
           <a:p>
             <a:fld id="{BDFCD27C-8599-43EF-BA1D-14DDC1946E06}" type="datetime1">
               <a:rPr lang="en-US" smtClean="0"/>
-              <a:t>2/26/2024</a:t>
+              <a:t>6/25/2024</a:t>
             </a:fld>
             <a:endParaRPr lang="en-US" dirty="0"/>
           </a:p>
@@ -24371,7 +24387,7 @@
           <a:p>
             <a:fld id="{49343D99-809A-49C0-96E5-4250D0B498EE}" type="datetime1">
               <a:rPr lang="en-US" smtClean="0"/>
-              <a:t>2/26/2024</a:t>
+              <a:t>6/25/2024</a:t>
             </a:fld>
             <a:endParaRPr lang="en-US" dirty="0"/>
           </a:p>
@@ -24489,7 +24505,7 @@
           <a:p>
             <a:fld id="{A143DE9B-B678-4EFB-BB7D-A4370204A0B0}" type="datetime1">
               <a:rPr lang="en-US" smtClean="0"/>
-              <a:t>2/26/2024</a:t>
+              <a:t>6/25/2024</a:t>
             </a:fld>
             <a:endParaRPr lang="en-US" dirty="0"/>
           </a:p>
@@ -24584,7 +24600,7 @@
           <a:p>
             <a:fld id="{E68812DA-F765-4142-A6A3-A8ED7235E082}" type="datetime1">
               <a:rPr lang="en-US" smtClean="0"/>
-              <a:t>2/26/2024</a:t>
+              <a:t>6/25/2024</a:t>
             </a:fld>
             <a:endParaRPr lang="en-US" dirty="0"/>
           </a:p>
@@ -24839,7 +24855,7 @@
           <a:p>
             <a:fld id="{3E0277FD-7DE6-41D4-930D-AC99F5AFE54E}" type="datetime1">
               <a:rPr lang="en-US" smtClean="0"/>
-              <a:t>2/26/2024</a:t>
+              <a:t>6/25/2024</a:t>
             </a:fld>
             <a:endParaRPr lang="en-US" dirty="0"/>
           </a:p>
@@ -25146,7 +25162,7 @@
           <a:p>
             <a:fld id="{9EA15526-7079-4B7B-987C-1B5FAE11A0FF}" type="datetime1">
               <a:rPr lang="en-US" smtClean="0"/>
-              <a:t>2/26/2024</a:t>
+              <a:t>6/25/2024</a:t>
             </a:fld>
             <a:endParaRPr lang="en-US" dirty="0"/>
           </a:p>
@@ -25381,7 +25397,7 @@
           <a:p>
             <a:fld id="{073ED0CC-082F-4160-86E5-0D6041F12778}" type="datetime1">
               <a:rPr lang="en-US" smtClean="0"/>
-              <a:t>2/26/2024</a:t>
+              <a:t>6/25/2024</a:t>
             </a:fld>
             <a:endParaRPr lang="en-US" dirty="0"/>
           </a:p>
@@ -26292,7 +26308,7 @@
           </a:effectLst>
           <a:extLst>
             <a:ext uri="{91240B29-F687-4f45-9708-019B960494DF}">
-              <a14:hiddenLine xmlns:a16="http://schemas.microsoft.com/office/drawing/2014/main" xmlns:p14="http://schemas.microsoft.com/office/powerpoint/2010/main" xmlns:a14="http://schemas.microsoft.com/office/drawing/2010/main" xmlns="" w="9525">
+              <a14:hiddenLine xmlns="" xmlns:a14="http://schemas.microsoft.com/office/drawing/2010/main" xmlns:p14="http://schemas.microsoft.com/office/powerpoint/2010/main" xmlns:a16="http://schemas.microsoft.com/office/drawing/2014/main" w="9525">
                 <a:solidFill>
                   <a:srgbClr val="000000"/>
                 </a:solidFill>
@@ -26690,7 +26706,7 @@
           </a:effectLst>
           <a:extLst>
             <a:ext uri="{91240B29-F687-4f45-9708-019B960494DF}">
-              <a14:hiddenLine xmlns:a16="http://schemas.microsoft.com/office/drawing/2014/main" xmlns:p14="http://schemas.microsoft.com/office/powerpoint/2010/main" xmlns:a14="http://schemas.microsoft.com/office/drawing/2010/main" xmlns="" w="9525">
+              <a14:hiddenLine xmlns="" xmlns:a14="http://schemas.microsoft.com/office/drawing/2010/main" xmlns:p14="http://schemas.microsoft.com/office/powerpoint/2010/main" xmlns:a16="http://schemas.microsoft.com/office/drawing/2014/main" w="9525">
                 <a:solidFill>
                   <a:srgbClr val="000000"/>
                 </a:solidFill>
@@ -27221,7 +27237,7 @@
             <p:ph idx="1"/>
             <p:extLst>
               <p:ext uri="{D42A27DB-BD31-4B8C-83A1-F6EECF244321}">
-                <p14:modId xmlns:p14="http://schemas.microsoft.com/office/powerpoint/2010/main" val="2723885610"/>
+                <p14:modId xmlns:p14="http://schemas.microsoft.com/office/powerpoint/2010/main" val="1066402754"/>
               </p:ext>
             </p:extLst>
           </p:nvPr>
@@ -27829,19 +27845,7 @@
                         <a:rPr lang="en-AU" sz="1100" dirty="0">
                           <a:effectLst/>
                         </a:rPr>
-                        <a:t>Print the contents of a file (or </a:t>
-                      </a:r>
-                      <a:r>
-                        <a:rPr lang="en-AU" sz="1100" dirty="0" err="1">
-                          <a:effectLst/>
-                        </a:rPr>
-                        <a:t>concatinate</a:t>
-                      </a:r>
-                      <a:r>
-                        <a:rPr lang="en-AU" sz="1100" dirty="0">
-                          <a:effectLst/>
-                        </a:rPr>
-                        <a:t> files)</a:t>
+                        <a:t>Print the contents of a file (or concatenate files)</a:t>
                       </a:r>
                     </a:p>
                   </a:txBody>
@@ -28981,7 +28985,7 @@
           </a:effectLst>
           <a:extLst>
             <a:ext uri="{91240B29-F687-4f45-9708-019B960494DF}">
-              <a14:hiddenLine xmlns="" xmlns:a14="http://schemas.microsoft.com/office/drawing/2010/main" xmlns:p14="http://schemas.microsoft.com/office/powerpoint/2010/main" xmlns:a16="http://schemas.microsoft.com/office/drawing/2014/main" w="9525">
+              <a14:hiddenLine xmlns:a16="http://schemas.microsoft.com/office/drawing/2014/main" xmlns:p14="http://schemas.microsoft.com/office/powerpoint/2010/main" xmlns:a14="http://schemas.microsoft.com/office/drawing/2010/main" xmlns="" w="9525">
                 <a:solidFill>
                   <a:srgbClr val="000000"/>
                 </a:solidFill>
@@ -29954,7 +29958,7 @@
           </a:effectLst>
           <a:extLst>
             <a:ext uri="{91240B29-F687-4f45-9708-019B960494DF}">
-              <a14:hiddenLine xmlns="" xmlns:a14="http://schemas.microsoft.com/office/drawing/2010/main" xmlns:p14="http://schemas.microsoft.com/office/powerpoint/2010/main" xmlns:a16="http://schemas.microsoft.com/office/drawing/2014/main" w="9525">
+              <a14:hiddenLine xmlns:a16="http://schemas.microsoft.com/office/drawing/2014/main" xmlns:p14="http://schemas.microsoft.com/office/powerpoint/2010/main" xmlns:a14="http://schemas.microsoft.com/office/drawing/2010/main" xmlns="" w="9525">
                 <a:solidFill>
                   <a:srgbClr val="000000"/>
                 </a:solidFill>
@@ -30414,7 +30418,7 @@
           </a:effectLst>
           <a:extLst>
             <a:ext uri="{91240B29-F687-4f45-9708-019B960494DF}">
-              <a14:hiddenLine xmlns="" xmlns:a14="http://schemas.microsoft.com/office/drawing/2010/main" xmlns:p14="http://schemas.microsoft.com/office/powerpoint/2010/main" xmlns:a16="http://schemas.microsoft.com/office/drawing/2014/main" w="9525">
+              <a14:hiddenLine xmlns:a16="http://schemas.microsoft.com/office/drawing/2014/main" xmlns:p14="http://schemas.microsoft.com/office/powerpoint/2010/main" xmlns:a14="http://schemas.microsoft.com/office/drawing/2010/main" xmlns="" w="9525">
                 <a:solidFill>
                   <a:srgbClr val="000000"/>
                 </a:solidFill>
@@ -32835,7 +32839,7 @@
           </a:effectLst>
           <a:extLst>
             <a:ext uri="{91240B29-F687-4f45-9708-019B960494DF}">
-              <a14:hiddenLine xmlns:a16="http://schemas.microsoft.com/office/drawing/2014/main" xmlns:p14="http://schemas.microsoft.com/office/powerpoint/2010/main" xmlns:a14="http://schemas.microsoft.com/office/drawing/2010/main" xmlns="" w="9525">
+              <a14:hiddenLine xmlns="" xmlns:a14="http://schemas.microsoft.com/office/drawing/2010/main" xmlns:p14="http://schemas.microsoft.com/office/powerpoint/2010/main" xmlns:a16="http://schemas.microsoft.com/office/drawing/2014/main" w="9525">
                 <a:solidFill>
                   <a:srgbClr val="000000"/>
                 </a:solidFill>

</xml_diff>